<commit_message>
title page of ppt
</commit_message>
<xml_diff>
--- a/presentation.pptx
+++ b/presentation.pptx
@@ -3429,19 +3429,19 @@
           <a:p>
             <a:r>
               <a:rPr lang="en-US" altLang="zh-TW" sz="2400" i="1" dirty="0"/>
-              <a:t>Constrained Piano-Sonata-Like </a:t>
+              <a:t>Specific Piano-</a:t>
+            </a:r>
+            <a:r>
+              <a:rPr lang="en-US" altLang="zh-TW" sz="2400" i="1" dirty="0" err="1"/>
+              <a:t>Sonatina</a:t>
+            </a:r>
+            <a:r>
+              <a:rPr lang="en-US" altLang="zh-TW" sz="2400" i="1" dirty="0"/>
+              <a:t>-Like Music Period Composition Using MRF</a:t>
             </a:r>
             <a:r>
               <a:rPr lang="en-US" altLang="zh-TW" sz="2400" i="1" dirty="0" smtClean="0"/>
-              <a:t>Music Composition </a:t>
-            </a:r>
-            <a:r>
-              <a:rPr lang="en-US" altLang="zh-TW" sz="2400" i="1" dirty="0"/>
-              <a:t>Using </a:t>
-            </a:r>
-            <a:r>
-              <a:rPr lang="en-US" altLang="zh-TW" sz="2400" i="1" dirty="0" smtClean="0"/>
-              <a:t>MRF</a:t>
+              <a:t/>
             </a:r>
             <a:br>
               <a:rPr lang="en-US" altLang="zh-TW" sz="2400" i="1" dirty="0" smtClean="0"/>
@@ -3462,11 +3462,15 @@
             </a:br>
             <a:r>
               <a:rPr lang="en-US" altLang="zh-TW" sz="2400" i="1" dirty="0" smtClean="0"/>
-              <a:t>Team - </a:t>
-            </a:r>
-            <a:r>
-              <a:rPr lang="en-US" altLang="zh-TW" sz="2400" i="1" dirty="0" err="1"/>
-              <a:t>Cucumburn</a:t>
+              <a:t>Team </a:t>
+            </a:r>
+            <a:r>
+              <a:rPr lang="en-US" altLang="zh-TW" sz="2400" i="1" dirty="0" smtClean="0"/>
+              <a:t>– </a:t>
+            </a:r>
+            <a:r>
+              <a:rPr lang="en-US" altLang="zh-TW" sz="2400" i="1" smtClean="0"/>
+              <a:t>Music composition</a:t>
             </a:r>
             <a:r>
               <a:rPr lang="en-US" altLang="zh-TW" sz="2400" i="1" dirty="0" smtClean="0"/>
@@ -4021,13 +4025,8 @@
           <a:p>
             <a:r>
               <a:rPr lang="en-US" altLang="zh-TW" dirty="0" smtClean="0"/>
-              <a:t>Define</a:t>
-            </a:r>
-            <a:r>
-              <a:rPr lang="en-US" altLang="zh-TW" dirty="0" smtClean="0"/>
-              <a:t> “unit”</a:t>
-            </a:r>
-            <a:endParaRPr lang="en-US" altLang="zh-TW" dirty="0" smtClean="0"/>
+              <a:t>Define “unit”</a:t>
+            </a:r>
           </a:p>
         </p:txBody>
       </p:sp>
@@ -4132,11 +4131,7 @@
           <a:p>
             <a:r>
               <a:rPr lang="en-US" altLang="zh-TW" dirty="0" smtClean="0"/>
-              <a:t>1400 units from Clementi </a:t>
-            </a:r>
-            <a:r>
-              <a:rPr lang="en-US" altLang="zh-TW" dirty="0" smtClean="0"/>
-              <a:t>op36</a:t>
+              <a:t>1400 units from Clementi op36</a:t>
             </a:r>
           </a:p>
           <a:p>

</xml_diff>